<commit_message>
Change Game Files to use Bytes not Ints
</commit_message>
<xml_diff>
--- a/Diagram.pptx
+++ b/Diagram.pptx
@@ -10,6 +10,8 @@
     <p:sldId id="258" r:id="rId4"/>
     <p:sldId id="259" r:id="rId5"/>
     <p:sldId id="260" r:id="rId6"/>
+    <p:sldId id="261" r:id="rId7"/>
+    <p:sldId id="262" r:id="rId8"/>
   </p:sldIdLst>
   <p:sldSz cx="12192000" cy="6858000"/>
   <p:notesSz cx="6858000" cy="9144000"/>
@@ -263,7 +265,7 @@
           <a:p>
             <a:fld id="{F6071535-C519-40D7-BF62-49135BF2DB0E}" type="datetimeFigureOut">
               <a:rPr lang="en-US" smtClean="0"/>
-              <a:t>4/22/2018</a:t>
+              <a:t>5/1/2018</a:t>
             </a:fld>
             <a:endParaRPr lang="en-US"/>
           </a:p>
@@ -461,7 +463,7 @@
           <a:p>
             <a:fld id="{F6071535-C519-40D7-BF62-49135BF2DB0E}" type="datetimeFigureOut">
               <a:rPr lang="en-US" smtClean="0"/>
-              <a:t>4/22/2018</a:t>
+              <a:t>5/1/2018</a:t>
             </a:fld>
             <a:endParaRPr lang="en-US"/>
           </a:p>
@@ -669,7 +671,7 @@
           <a:p>
             <a:fld id="{F6071535-C519-40D7-BF62-49135BF2DB0E}" type="datetimeFigureOut">
               <a:rPr lang="en-US" smtClean="0"/>
-              <a:t>4/22/2018</a:t>
+              <a:t>5/1/2018</a:t>
             </a:fld>
             <a:endParaRPr lang="en-US"/>
           </a:p>
@@ -867,7 +869,7 @@
           <a:p>
             <a:fld id="{F6071535-C519-40D7-BF62-49135BF2DB0E}" type="datetimeFigureOut">
               <a:rPr lang="en-US" smtClean="0"/>
-              <a:t>4/22/2018</a:t>
+              <a:t>5/1/2018</a:t>
             </a:fld>
             <a:endParaRPr lang="en-US"/>
           </a:p>
@@ -1142,7 +1144,7 @@
           <a:p>
             <a:fld id="{F6071535-C519-40D7-BF62-49135BF2DB0E}" type="datetimeFigureOut">
               <a:rPr lang="en-US" smtClean="0"/>
-              <a:t>4/22/2018</a:t>
+              <a:t>5/1/2018</a:t>
             </a:fld>
             <a:endParaRPr lang="en-US"/>
           </a:p>
@@ -1407,7 +1409,7 @@
           <a:p>
             <a:fld id="{F6071535-C519-40D7-BF62-49135BF2DB0E}" type="datetimeFigureOut">
               <a:rPr lang="en-US" smtClean="0"/>
-              <a:t>4/22/2018</a:t>
+              <a:t>5/1/2018</a:t>
             </a:fld>
             <a:endParaRPr lang="en-US"/>
           </a:p>
@@ -1819,7 +1821,7 @@
           <a:p>
             <a:fld id="{F6071535-C519-40D7-BF62-49135BF2DB0E}" type="datetimeFigureOut">
               <a:rPr lang="en-US" smtClean="0"/>
-              <a:t>4/22/2018</a:t>
+              <a:t>5/1/2018</a:t>
             </a:fld>
             <a:endParaRPr lang="en-US"/>
           </a:p>
@@ -1960,7 +1962,7 @@
           <a:p>
             <a:fld id="{F6071535-C519-40D7-BF62-49135BF2DB0E}" type="datetimeFigureOut">
               <a:rPr lang="en-US" smtClean="0"/>
-              <a:t>4/22/2018</a:t>
+              <a:t>5/1/2018</a:t>
             </a:fld>
             <a:endParaRPr lang="en-US"/>
           </a:p>
@@ -2073,7 +2075,7 @@
           <a:p>
             <a:fld id="{F6071535-C519-40D7-BF62-49135BF2DB0E}" type="datetimeFigureOut">
               <a:rPr lang="en-US" smtClean="0"/>
-              <a:t>4/22/2018</a:t>
+              <a:t>5/1/2018</a:t>
             </a:fld>
             <a:endParaRPr lang="en-US"/>
           </a:p>
@@ -2384,7 +2386,7 @@
           <a:p>
             <a:fld id="{F6071535-C519-40D7-BF62-49135BF2DB0E}" type="datetimeFigureOut">
               <a:rPr lang="en-US" smtClean="0"/>
-              <a:t>4/22/2018</a:t>
+              <a:t>5/1/2018</a:t>
             </a:fld>
             <a:endParaRPr lang="en-US"/>
           </a:p>
@@ -2672,7 +2674,7 @@
           <a:p>
             <a:fld id="{F6071535-C519-40D7-BF62-49135BF2DB0E}" type="datetimeFigureOut">
               <a:rPr lang="en-US" smtClean="0"/>
-              <a:t>4/22/2018</a:t>
+              <a:t>5/1/2018</a:t>
             </a:fld>
             <a:endParaRPr lang="en-US"/>
           </a:p>
@@ -2913,7 +2915,7 @@
           <a:p>
             <a:fld id="{F6071535-C519-40D7-BF62-49135BF2DB0E}" type="datetimeFigureOut">
               <a:rPr lang="en-US" smtClean="0"/>
-              <a:t>4/22/2018</a:t>
+              <a:t>5/1/2018</a:t>
             </a:fld>
             <a:endParaRPr lang="en-US"/>
           </a:p>
@@ -9648,6 +9650,274 @@
 </p:sld>
 </file>
 
+<file path=ppt/slides/slide6.xml><?xml version="1.0" encoding="utf-8"?>
+<p:sld xmlns:a="http://schemas.openxmlformats.org/drawingml/2006/main" xmlns:r="http://schemas.openxmlformats.org/officeDocument/2006/relationships" xmlns:p="http://schemas.openxmlformats.org/presentationml/2006/main">
+  <p:cSld>
+    <p:spTree>
+      <p:nvGrpSpPr>
+        <p:cNvPr id="1" name=""/>
+        <p:cNvGrpSpPr/>
+        <p:nvPr/>
+      </p:nvGrpSpPr>
+      <p:grpSpPr>
+        <a:xfrm>
+          <a:off x="0" y="0"/>
+          <a:ext cx="0" cy="0"/>
+          <a:chOff x="0" y="0"/>
+          <a:chExt cx="0" cy="0"/>
+        </a:xfrm>
+      </p:grpSpPr>
+      <p:sp>
+        <p:nvSpPr>
+          <p:cNvPr id="2" name="Title 1">
+            <a:extLst>
+              <a:ext uri="{FF2B5EF4-FFF2-40B4-BE49-F238E27FC236}">
+                <a16:creationId xmlns:a16="http://schemas.microsoft.com/office/drawing/2014/main" id="{A95B9604-CE68-44E1-85BC-911CB1B8300D}"/>
+              </a:ext>
+            </a:extLst>
+          </p:cNvPr>
+          <p:cNvSpPr>
+            <a:spLocks noGrp="1"/>
+          </p:cNvSpPr>
+          <p:nvPr>
+            <p:ph type="title"/>
+          </p:nvPr>
+        </p:nvSpPr>
+        <p:spPr/>
+        <p:txBody>
+          <a:bodyPr/>
+          <a:lstStyle/>
+          <a:p>
+            <a:r>
+              <a:rPr lang="en-US" dirty="0"/>
+              <a:t>NN File</a:t>
+            </a:r>
+          </a:p>
+        </p:txBody>
+      </p:sp>
+      <p:sp>
+        <p:nvSpPr>
+          <p:cNvPr id="3" name="Content Placeholder 2">
+            <a:extLst>
+              <a:ext uri="{FF2B5EF4-FFF2-40B4-BE49-F238E27FC236}">
+                <a16:creationId xmlns:a16="http://schemas.microsoft.com/office/drawing/2014/main" id="{728C90DB-13C2-4C08-A3E7-4E33118018CC}"/>
+              </a:ext>
+            </a:extLst>
+          </p:cNvPr>
+          <p:cNvSpPr>
+            <a:spLocks noGrp="1"/>
+          </p:cNvSpPr>
+          <p:nvPr>
+            <p:ph idx="1"/>
+          </p:nvPr>
+        </p:nvSpPr>
+        <p:spPr>
+          <a:xfrm>
+            <a:off x="838200" y="1614609"/>
+            <a:ext cx="10515600" cy="4351338"/>
+          </a:xfrm>
+        </p:spPr>
+        <p:txBody>
+          <a:bodyPr/>
+          <a:lstStyle/>
+          <a:p>
+            <a:r>
+              <a:rPr lang="en-US" dirty="0"/>
+              <a:t>‘N’</a:t>
+            </a:r>
+          </a:p>
+          <a:p>
+            <a:r>
+              <a:rPr lang="en-US" dirty="0"/>
+              <a:t># layers (including start and end)</a:t>
+            </a:r>
+          </a:p>
+          <a:p>
+            <a:r>
+              <a:rPr lang="en-US" dirty="0"/>
+              <a:t># nodes in each layer</a:t>
+            </a:r>
+          </a:p>
+          <a:p>
+            <a:r>
+              <a:rPr lang="en-US" dirty="0"/>
+              <a:t># weight matrices</a:t>
+            </a:r>
+          </a:p>
+          <a:p>
+            <a:r>
+              <a:rPr lang="en-US" dirty="0"/>
+              <a:t># rows, # columns in each weight matrix</a:t>
+            </a:r>
+          </a:p>
+          <a:p>
+            <a:r>
+              <a:rPr lang="en-US" dirty="0"/>
+              <a:t>Weight double data</a:t>
+            </a:r>
+          </a:p>
+          <a:p>
+            <a:endParaRPr lang="en-US" dirty="0"/>
+          </a:p>
+        </p:txBody>
+      </p:sp>
+    </p:spTree>
+    <p:extLst>
+      <p:ext uri="{BB962C8B-B14F-4D97-AF65-F5344CB8AC3E}">
+        <p14:creationId xmlns:p14="http://schemas.microsoft.com/office/powerpoint/2010/main" val="868176123"/>
+      </p:ext>
+    </p:extLst>
+  </p:cSld>
+  <p:clrMapOvr>
+    <a:masterClrMapping/>
+  </p:clrMapOvr>
+</p:sld>
+</file>
+
+<file path=ppt/slides/slide7.xml><?xml version="1.0" encoding="utf-8"?>
+<p:sld xmlns:a="http://schemas.openxmlformats.org/drawingml/2006/main" xmlns:r="http://schemas.openxmlformats.org/officeDocument/2006/relationships" xmlns:p="http://schemas.openxmlformats.org/presentationml/2006/main">
+  <p:cSld>
+    <p:spTree>
+      <p:nvGrpSpPr>
+        <p:cNvPr id="1" name=""/>
+        <p:cNvGrpSpPr/>
+        <p:nvPr/>
+      </p:nvGrpSpPr>
+      <p:grpSpPr>
+        <a:xfrm>
+          <a:off x="0" y="0"/>
+          <a:ext cx="0" cy="0"/>
+          <a:chOff x="0" y="0"/>
+          <a:chExt cx="0" cy="0"/>
+        </a:xfrm>
+      </p:grpSpPr>
+      <p:sp>
+        <p:nvSpPr>
+          <p:cNvPr id="2" name="Title 1">
+            <a:extLst>
+              <a:ext uri="{FF2B5EF4-FFF2-40B4-BE49-F238E27FC236}">
+                <a16:creationId xmlns:a16="http://schemas.microsoft.com/office/drawing/2014/main" id="{0FF7C495-7181-4C67-89B1-8317C9B8A0F4}"/>
+              </a:ext>
+            </a:extLst>
+          </p:cNvPr>
+          <p:cNvSpPr>
+            <a:spLocks noGrp="1"/>
+          </p:cNvSpPr>
+          <p:nvPr>
+            <p:ph type="title"/>
+          </p:nvPr>
+        </p:nvSpPr>
+        <p:spPr/>
+        <p:txBody>
+          <a:bodyPr/>
+          <a:lstStyle/>
+          <a:p>
+            <a:r>
+              <a:rPr lang="en-US" dirty="0"/>
+              <a:t>CNN File</a:t>
+            </a:r>
+          </a:p>
+        </p:txBody>
+      </p:sp>
+      <p:sp>
+        <p:nvSpPr>
+          <p:cNvPr id="3" name="Content Placeholder 2">
+            <a:extLst>
+              <a:ext uri="{FF2B5EF4-FFF2-40B4-BE49-F238E27FC236}">
+                <a16:creationId xmlns:a16="http://schemas.microsoft.com/office/drawing/2014/main" id="{955B6F4A-D314-4C42-8D39-C549FD9B8A01}"/>
+              </a:ext>
+            </a:extLst>
+          </p:cNvPr>
+          <p:cNvSpPr>
+            <a:spLocks noGrp="1"/>
+          </p:cNvSpPr>
+          <p:nvPr>
+            <p:ph idx="1"/>
+          </p:nvPr>
+        </p:nvSpPr>
+        <p:spPr>
+          <a:xfrm>
+            <a:off x="838200" y="1561854"/>
+            <a:ext cx="10515600" cy="5076337"/>
+          </a:xfrm>
+        </p:spPr>
+        <p:txBody>
+          <a:bodyPr>
+            <a:normAutofit/>
+          </a:bodyPr>
+          <a:lstStyle/>
+          <a:p>
+            <a:r>
+              <a:rPr lang="en-US" dirty="0"/>
+              <a:t>‘C’</a:t>
+            </a:r>
+          </a:p>
+          <a:p>
+            <a:r>
+              <a:rPr lang="en-US" dirty="0"/>
+              <a:t>Input image width</a:t>
+            </a:r>
+          </a:p>
+          <a:p>
+            <a:r>
+              <a:rPr lang="en-US" dirty="0"/>
+              <a:t># convolution layers</a:t>
+            </a:r>
+          </a:p>
+          <a:p>
+            <a:r>
+              <a:rPr lang="en-US" dirty="0"/>
+              <a:t># fully connected layers (includes last layer)</a:t>
+            </a:r>
+          </a:p>
+          <a:p>
+            <a:r>
+              <a:rPr lang="en-US" dirty="0"/>
+              <a:t>Filter width for each convolution layer</a:t>
+            </a:r>
+          </a:p>
+          <a:p>
+            <a:r>
+              <a:rPr lang="en-US" dirty="0"/>
+              <a:t># nodes in each fully connected layer</a:t>
+            </a:r>
+          </a:p>
+          <a:p>
+            <a:r>
+              <a:rPr lang="en-US" dirty="0"/>
+              <a:t># weight matrices</a:t>
+            </a:r>
+          </a:p>
+          <a:p>
+            <a:r>
+              <a:rPr lang="en-US" dirty="0"/>
+              <a:t># rows, # columns in each weight matrix</a:t>
+            </a:r>
+          </a:p>
+          <a:p>
+            <a:r>
+              <a:rPr lang="en-US" dirty="0"/>
+              <a:t>Weight double data</a:t>
+            </a:r>
+          </a:p>
+          <a:p>
+            <a:endParaRPr lang="en-US" dirty="0"/>
+          </a:p>
+        </p:txBody>
+      </p:sp>
+    </p:spTree>
+    <p:extLst>
+      <p:ext uri="{BB962C8B-B14F-4D97-AF65-F5344CB8AC3E}">
+        <p14:creationId xmlns:p14="http://schemas.microsoft.com/office/powerpoint/2010/main" val="884396633"/>
+      </p:ext>
+    </p:extLst>
+  </p:cSld>
+  <p:clrMapOvr>
+    <a:masterClrMapping/>
+  </p:clrMapOvr>
+</p:sld>
+</file>
+
 <file path=ppt/theme/theme1.xml><?xml version="1.0" encoding="utf-8"?>
 <a:theme xmlns:a="http://schemas.openxmlformats.org/drawingml/2006/main" name="Office Theme">
   <a:themeElements>

</xml_diff>